<commit_message>
Se agregaron tablas e imágenes
Se agregó la tabla de valores y algunas imágenes a las diapositivas
</commit_message>
<xml_diff>
--- a/ProyectoM1.pptx
+++ b/ProyectoM1.pptx
@@ -5,12 +5,12 @@
     <p:sldMasterId id="2147483659" r:id="rId1"/>
   </p:sldMasterIdLst>
   <p:notesMasterIdLst>
-    <p:notesMasterId r:id="rId12"/>
+    <p:notesMasterId r:id="rId13"/>
   </p:notesMasterIdLst>
   <p:sldIdLst>
     <p:sldId id="256" r:id="rId2"/>
     <p:sldId id="257" r:id="rId3"/>
-    <p:sldId id="265" r:id="rId4"/>
+    <p:sldId id="266" r:id="rId4"/>
     <p:sldId id="258" r:id="rId5"/>
     <p:sldId id="259" r:id="rId6"/>
     <p:sldId id="260" r:id="rId7"/>
@@ -18,21 +18,22 @@
     <p:sldId id="262" r:id="rId9"/>
     <p:sldId id="263" r:id="rId10"/>
     <p:sldId id="264" r:id="rId11"/>
+    <p:sldId id="265" r:id="rId12"/>
   </p:sldIdLst>
   <p:sldSz cx="9144000" cy="5143500" type="screen16x9"/>
   <p:notesSz cx="6858000" cy="9144000"/>
   <p:embeddedFontLst>
     <p:embeddedFont>
       <p:font typeface="Maven Pro" panose="020B0604020202020204" charset="0"/>
-      <p:regular r:id="rId13"/>
-      <p:bold r:id="rId14"/>
+      <p:regular r:id="rId14"/>
+      <p:bold r:id="rId15"/>
     </p:embeddedFont>
     <p:embeddedFont>
       <p:font typeface="Nunito" panose="020B0604020202020204" charset="0"/>
-      <p:regular r:id="rId15"/>
-      <p:bold r:id="rId16"/>
-      <p:italic r:id="rId17"/>
-      <p:boldItalic r:id="rId18"/>
+      <p:regular r:id="rId16"/>
+      <p:bold r:id="rId17"/>
+      <p:italic r:id="rId18"/>
+      <p:boldItalic r:id="rId19"/>
     </p:embeddedFont>
   </p:embeddedFontLst>
   <p:defaultTextStyle>
@@ -828,6 +829,110 @@
 </p:notes>
 </file>
 
+<file path=ppt/notesSlides/notesSlide10.xml><?xml version="1.0" encoding="utf-8"?>
+<p:notes xmlns:a="http://schemas.openxmlformats.org/drawingml/2006/main" xmlns:r="http://schemas.openxmlformats.org/officeDocument/2006/relationships" xmlns:p="http://schemas.openxmlformats.org/presentationml/2006/main" showMasterSp="0" showMasterPhAnim="0">
+  <p:cSld>
+    <p:spTree>
+      <p:nvGrpSpPr>
+        <p:cNvPr id="1" name="Shape 330"/>
+        <p:cNvGrpSpPr/>
+        <p:nvPr/>
+      </p:nvGrpSpPr>
+      <p:grpSpPr>
+        <a:xfrm>
+          <a:off x="0" y="0"/>
+          <a:ext cx="0" cy="0"/>
+          <a:chOff x="0" y="0"/>
+          <a:chExt cx="0" cy="0"/>
+        </a:xfrm>
+      </p:grpSpPr>
+      <p:sp>
+        <p:nvSpPr>
+          <p:cNvPr id="331" name="Google Shape;331;g61c43cb06b_0_539:notes"/>
+          <p:cNvSpPr>
+            <a:spLocks noGrp="1" noRot="1" noChangeAspect="1"/>
+          </p:cNvSpPr>
+          <p:nvPr>
+            <p:ph type="sldImg" idx="2"/>
+          </p:nvPr>
+        </p:nvSpPr>
+        <p:spPr>
+          <a:xfrm>
+            <a:off x="381300" y="685800"/>
+            <a:ext cx="6096000" cy="3429000"/>
+          </a:xfrm>
+          <a:custGeom>
+            <a:avLst/>
+            <a:gdLst/>
+            <a:ahLst/>
+            <a:cxnLst/>
+            <a:rect l="l" t="t" r="r" b="b"/>
+            <a:pathLst>
+              <a:path w="120000" h="120000" extrusionOk="0">
+                <a:moveTo>
+                  <a:pt x="0" y="0"/>
+                </a:moveTo>
+                <a:lnTo>
+                  <a:pt x="120000" y="0"/>
+                </a:lnTo>
+                <a:lnTo>
+                  <a:pt x="120000" y="120000"/>
+                </a:lnTo>
+                <a:lnTo>
+                  <a:pt x="0" y="120000"/>
+                </a:lnTo>
+                <a:close/>
+              </a:path>
+            </a:pathLst>
+          </a:custGeom>
+        </p:spPr>
+      </p:sp>
+      <p:sp>
+        <p:nvSpPr>
+          <p:cNvPr id="332" name="Google Shape;332;g61c43cb06b_0_539:notes"/>
+          <p:cNvSpPr txBox="1">
+            <a:spLocks noGrp="1"/>
+          </p:cNvSpPr>
+          <p:nvPr>
+            <p:ph type="body" idx="1"/>
+          </p:nvPr>
+        </p:nvSpPr>
+        <p:spPr>
+          <a:xfrm>
+            <a:off x="685800" y="4343400"/>
+            <a:ext cx="5486400" cy="4114800"/>
+          </a:xfrm>
+          <a:prstGeom prst="rect">
+            <a:avLst/>
+          </a:prstGeom>
+        </p:spPr>
+        <p:txBody>
+          <a:bodyPr spcFirstLastPara="1" wrap="square" lIns="91425" tIns="91425" rIns="91425" bIns="91425" anchor="t" anchorCtr="0">
+            <a:noAutofit/>
+          </a:bodyPr>
+          <a:lstStyle/>
+          <a:p>
+            <a:pPr marL="0" lvl="0" indent="0" algn="l" rtl="0">
+              <a:spcBef>
+                <a:spcPts val="0"/>
+              </a:spcBef>
+              <a:spcAft>
+                <a:spcPts val="0"/>
+              </a:spcAft>
+              <a:buNone/>
+            </a:pPr>
+            <a:endParaRPr/>
+          </a:p>
+        </p:txBody>
+      </p:sp>
+    </p:spTree>
+  </p:cSld>
+  <p:clrMapOvr>
+    <a:masterClrMapping/>
+  </p:clrMapOvr>
+</p:notes>
+</file>
+
 <file path=ppt/notesSlides/notesSlide2.xml><?xml version="1.0" encoding="utf-8"?>
 <p:notes xmlns:a="http://schemas.openxmlformats.org/drawingml/2006/main" xmlns:r="http://schemas.openxmlformats.org/officeDocument/2006/relationships" xmlns:p="http://schemas.openxmlformats.org/presentationml/2006/main" showMasterSp="0" showMasterPhAnim="0">
   <p:cSld>
@@ -1145,7 +1250,7 @@
   <p:cSld>
     <p:spTree>
       <p:nvGrpSpPr>
-        <p:cNvPr id="1" name="Shape 298"/>
+        <p:cNvPr id="1" name="Shape 299"/>
         <p:cNvGrpSpPr/>
         <p:nvPr/>
       </p:nvGrpSpPr>
@@ -1159,7 +1264,111 @@
       </p:grpSpPr>
       <p:sp>
         <p:nvSpPr>
-          <p:cNvPr id="299" name="Google Shape;299;g61c43cb06b_0_533:notes"/>
+          <p:cNvPr id="300" name="Google Shape;300;g61c43cb06b_1_17:notes"/>
+          <p:cNvSpPr>
+            <a:spLocks noGrp="1" noRot="1" noChangeAspect="1"/>
+          </p:cNvSpPr>
+          <p:nvPr>
+            <p:ph type="sldImg" idx="2"/>
+          </p:nvPr>
+        </p:nvSpPr>
+        <p:spPr>
+          <a:xfrm>
+            <a:off x="381000" y="685800"/>
+            <a:ext cx="6096000" cy="3429000"/>
+          </a:xfrm>
+          <a:custGeom>
+            <a:avLst/>
+            <a:gdLst/>
+            <a:ahLst/>
+            <a:cxnLst/>
+            <a:rect l="l" t="t" r="r" b="b"/>
+            <a:pathLst>
+              <a:path w="120000" h="120000" extrusionOk="0">
+                <a:moveTo>
+                  <a:pt x="0" y="0"/>
+                </a:moveTo>
+                <a:lnTo>
+                  <a:pt x="120000" y="0"/>
+                </a:lnTo>
+                <a:lnTo>
+                  <a:pt x="120000" y="120000"/>
+                </a:lnTo>
+                <a:lnTo>
+                  <a:pt x="0" y="120000"/>
+                </a:lnTo>
+                <a:close/>
+              </a:path>
+            </a:pathLst>
+          </a:custGeom>
+        </p:spPr>
+      </p:sp>
+      <p:sp>
+        <p:nvSpPr>
+          <p:cNvPr id="301" name="Google Shape;301;g61c43cb06b_1_17:notes"/>
+          <p:cNvSpPr txBox="1">
+            <a:spLocks noGrp="1"/>
+          </p:cNvSpPr>
+          <p:nvPr>
+            <p:ph type="body" idx="1"/>
+          </p:nvPr>
+        </p:nvSpPr>
+        <p:spPr>
+          <a:xfrm>
+            <a:off x="685800" y="4343400"/>
+            <a:ext cx="5486400" cy="4114800"/>
+          </a:xfrm>
+          <a:prstGeom prst="rect">
+            <a:avLst/>
+          </a:prstGeom>
+        </p:spPr>
+        <p:txBody>
+          <a:bodyPr spcFirstLastPara="1" wrap="square" lIns="91425" tIns="91425" rIns="91425" bIns="91425" anchor="t" anchorCtr="0">
+            <a:noAutofit/>
+          </a:bodyPr>
+          <a:lstStyle/>
+          <a:p>
+            <a:pPr marL="0" lvl="0" indent="0" algn="l" rtl="0">
+              <a:spcBef>
+                <a:spcPts val="0"/>
+              </a:spcBef>
+              <a:spcAft>
+                <a:spcPts val="0"/>
+              </a:spcAft>
+              <a:buNone/>
+            </a:pPr>
+            <a:endParaRPr/>
+          </a:p>
+        </p:txBody>
+      </p:sp>
+    </p:spTree>
+  </p:cSld>
+  <p:clrMapOvr>
+    <a:masterClrMapping/>
+  </p:clrMapOvr>
+</p:notes>
+</file>
+
+<file path=ppt/notesSlides/notesSlide6.xml><?xml version="1.0" encoding="utf-8"?>
+<p:notes xmlns:a="http://schemas.openxmlformats.org/drawingml/2006/main" xmlns:r="http://schemas.openxmlformats.org/officeDocument/2006/relationships" xmlns:p="http://schemas.openxmlformats.org/presentationml/2006/main" showMasterSp="0" showMasterPhAnim="0">
+  <p:cSld>
+    <p:spTree>
+      <p:nvGrpSpPr>
+        <p:cNvPr id="1" name="Shape 307"/>
+        <p:cNvGrpSpPr/>
+        <p:nvPr/>
+      </p:nvGrpSpPr>
+      <p:grpSpPr>
+        <a:xfrm>
+          <a:off x="0" y="0"/>
+          <a:ext cx="0" cy="0"/>
+          <a:chOff x="0" y="0"/>
+          <a:chExt cx="0" cy="0"/>
+        </a:xfrm>
+      </p:grpSpPr>
+      <p:sp>
+        <p:nvSpPr>
+          <p:cNvPr id="308" name="Google Shape;308;g61c43cb06b_0_533:notes"/>
           <p:cNvSpPr>
             <a:spLocks noGrp="1" noRot="1" noChangeAspect="1"/>
           </p:cNvSpPr>
@@ -1200,7 +1409,7 @@
       </p:sp>
       <p:sp>
         <p:nvSpPr>
-          <p:cNvPr id="300" name="Google Shape;300;g61c43cb06b_0_533:notes"/>
+          <p:cNvPr id="309" name="Google Shape;309;g61c43cb06b_0_533:notes"/>
           <p:cNvSpPr txBox="1">
             <a:spLocks noGrp="1"/>
           </p:cNvSpPr>
@@ -1244,12 +1453,12 @@
 </p:notes>
 </file>
 
-<file path=ppt/notesSlides/notesSlide6.xml><?xml version="1.0" encoding="utf-8"?>
+<file path=ppt/notesSlides/notesSlide7.xml><?xml version="1.0" encoding="utf-8"?>
 <p:notes xmlns:a="http://schemas.openxmlformats.org/drawingml/2006/main" xmlns:r="http://schemas.openxmlformats.org/officeDocument/2006/relationships" xmlns:p="http://schemas.openxmlformats.org/presentationml/2006/main" showMasterSp="0" showMasterPhAnim="0">
   <p:cSld>
     <p:spTree>
       <p:nvGrpSpPr>
-        <p:cNvPr id="1" name="Shape 303"/>
+        <p:cNvPr id="1" name="Shape 312"/>
         <p:cNvGrpSpPr/>
         <p:nvPr/>
       </p:nvGrpSpPr>
@@ -1263,7 +1472,7 @@
       </p:grpSpPr>
       <p:sp>
         <p:nvSpPr>
-          <p:cNvPr id="304" name="Google Shape;304;g61c43cb06b_1_0:notes"/>
+          <p:cNvPr id="313" name="Google Shape;313;g61c43cb06b_1_0:notes"/>
           <p:cNvSpPr>
             <a:spLocks noGrp="1" noRot="1" noChangeAspect="1"/>
           </p:cNvSpPr>
@@ -1304,7 +1513,7 @@
       </p:sp>
       <p:sp>
         <p:nvSpPr>
-          <p:cNvPr id="305" name="Google Shape;305;g61c43cb06b_1_0:notes"/>
+          <p:cNvPr id="314" name="Google Shape;314;g61c43cb06b_1_0:notes"/>
           <p:cNvSpPr txBox="1">
             <a:spLocks noGrp="1"/>
           </p:cNvSpPr>
@@ -1348,12 +1557,12 @@
 </p:notes>
 </file>
 
-<file path=ppt/notesSlides/notesSlide7.xml><?xml version="1.0" encoding="utf-8"?>
+<file path=ppt/notesSlides/notesSlide8.xml><?xml version="1.0" encoding="utf-8"?>
 <p:notes xmlns:a="http://schemas.openxmlformats.org/drawingml/2006/main" xmlns:r="http://schemas.openxmlformats.org/officeDocument/2006/relationships" xmlns:p="http://schemas.openxmlformats.org/presentationml/2006/main" showMasterSp="0" showMasterPhAnim="0">
   <p:cSld>
     <p:spTree>
       <p:nvGrpSpPr>
-        <p:cNvPr id="1" name="Shape 308"/>
+        <p:cNvPr id="1" name="Shape 317"/>
         <p:cNvGrpSpPr/>
         <p:nvPr/>
       </p:nvGrpSpPr>
@@ -1367,7 +1576,7 @@
       </p:grpSpPr>
       <p:sp>
         <p:nvSpPr>
-          <p:cNvPr id="309" name="Google Shape;309;g61c43cb06b_1_6:notes"/>
+          <p:cNvPr id="318" name="Google Shape;318;g61c43cb06b_1_6:notes"/>
           <p:cNvSpPr>
             <a:spLocks noGrp="1" noRot="1" noChangeAspect="1"/>
           </p:cNvSpPr>
@@ -1408,7 +1617,7 @@
       </p:sp>
       <p:sp>
         <p:nvSpPr>
-          <p:cNvPr id="310" name="Google Shape;310;g61c43cb06b_1_6:notes"/>
+          <p:cNvPr id="319" name="Google Shape;319;g61c43cb06b_1_6:notes"/>
           <p:cNvSpPr txBox="1">
             <a:spLocks noGrp="1"/>
           </p:cNvSpPr>
@@ -1452,12 +1661,12 @@
 </p:notes>
 </file>
 
-<file path=ppt/notesSlides/notesSlide8.xml><?xml version="1.0" encoding="utf-8"?>
+<file path=ppt/notesSlides/notesSlide9.xml><?xml version="1.0" encoding="utf-8"?>
 <p:notes xmlns:a="http://schemas.openxmlformats.org/drawingml/2006/main" xmlns:r="http://schemas.openxmlformats.org/officeDocument/2006/relationships" xmlns:p="http://schemas.openxmlformats.org/presentationml/2006/main" showMasterSp="0" showMasterPhAnim="0">
   <p:cSld>
     <p:spTree>
       <p:nvGrpSpPr>
-        <p:cNvPr id="1" name="Shape 315"/>
+        <p:cNvPr id="1" name="Shape 324"/>
         <p:cNvGrpSpPr/>
         <p:nvPr/>
       </p:nvGrpSpPr>
@@ -1471,7 +1680,7 @@
       </p:grpSpPr>
       <p:sp>
         <p:nvSpPr>
-          <p:cNvPr id="316" name="Google Shape;316;g61c43cb06b_1_12:notes"/>
+          <p:cNvPr id="325" name="Google Shape;325;g61c43cb06b_1_12:notes"/>
           <p:cNvSpPr>
             <a:spLocks noGrp="1" noRot="1" noChangeAspect="1"/>
           </p:cNvSpPr>
@@ -1512,111 +1721,7 @@
       </p:sp>
       <p:sp>
         <p:nvSpPr>
-          <p:cNvPr id="317" name="Google Shape;317;g61c43cb06b_1_12:notes"/>
-          <p:cNvSpPr txBox="1">
-            <a:spLocks noGrp="1"/>
-          </p:cNvSpPr>
-          <p:nvPr>
-            <p:ph type="body" idx="1"/>
-          </p:nvPr>
-        </p:nvSpPr>
-        <p:spPr>
-          <a:xfrm>
-            <a:off x="685800" y="4343400"/>
-            <a:ext cx="5486400" cy="4114800"/>
-          </a:xfrm>
-          <a:prstGeom prst="rect">
-            <a:avLst/>
-          </a:prstGeom>
-        </p:spPr>
-        <p:txBody>
-          <a:bodyPr spcFirstLastPara="1" wrap="square" lIns="91425" tIns="91425" rIns="91425" bIns="91425" anchor="t" anchorCtr="0">
-            <a:noAutofit/>
-          </a:bodyPr>
-          <a:lstStyle/>
-          <a:p>
-            <a:pPr marL="0" lvl="0" indent="0" algn="l" rtl="0">
-              <a:spcBef>
-                <a:spcPts val="0"/>
-              </a:spcBef>
-              <a:spcAft>
-                <a:spcPts val="0"/>
-              </a:spcAft>
-              <a:buNone/>
-            </a:pPr>
-            <a:endParaRPr/>
-          </a:p>
-        </p:txBody>
-      </p:sp>
-    </p:spTree>
-  </p:cSld>
-  <p:clrMapOvr>
-    <a:masterClrMapping/>
-  </p:clrMapOvr>
-</p:notes>
-</file>
-
-<file path=ppt/notesSlides/notesSlide9.xml><?xml version="1.0" encoding="utf-8"?>
-<p:notes xmlns:a="http://schemas.openxmlformats.org/drawingml/2006/main" xmlns:r="http://schemas.openxmlformats.org/officeDocument/2006/relationships" xmlns:p="http://schemas.openxmlformats.org/presentationml/2006/main" showMasterSp="0" showMasterPhAnim="0">
-  <p:cSld>
-    <p:spTree>
-      <p:nvGrpSpPr>
-        <p:cNvPr id="1" name="Shape 321"/>
-        <p:cNvGrpSpPr/>
-        <p:nvPr/>
-      </p:nvGrpSpPr>
-      <p:grpSpPr>
-        <a:xfrm>
-          <a:off x="0" y="0"/>
-          <a:ext cx="0" cy="0"/>
-          <a:chOff x="0" y="0"/>
-          <a:chExt cx="0" cy="0"/>
-        </a:xfrm>
-      </p:grpSpPr>
-      <p:sp>
-        <p:nvSpPr>
-          <p:cNvPr id="322" name="Google Shape;322;g61c43cb06b_0_539:notes"/>
-          <p:cNvSpPr>
-            <a:spLocks noGrp="1" noRot="1" noChangeAspect="1"/>
-          </p:cNvSpPr>
-          <p:nvPr>
-            <p:ph type="sldImg" idx="2"/>
-          </p:nvPr>
-        </p:nvSpPr>
-        <p:spPr>
-          <a:xfrm>
-            <a:off x="381300" y="685800"/>
-            <a:ext cx="6096000" cy="3429000"/>
-          </a:xfrm>
-          <a:custGeom>
-            <a:avLst/>
-            <a:gdLst/>
-            <a:ahLst/>
-            <a:cxnLst/>
-            <a:rect l="l" t="t" r="r" b="b"/>
-            <a:pathLst>
-              <a:path w="120000" h="120000" extrusionOk="0">
-                <a:moveTo>
-                  <a:pt x="0" y="0"/>
-                </a:moveTo>
-                <a:lnTo>
-                  <a:pt x="120000" y="0"/>
-                </a:lnTo>
-                <a:lnTo>
-                  <a:pt x="120000" y="120000"/>
-                </a:lnTo>
-                <a:lnTo>
-                  <a:pt x="0" y="120000"/>
-                </a:lnTo>
-                <a:close/>
-              </a:path>
-            </a:pathLst>
-          </a:custGeom>
-        </p:spPr>
-      </p:sp>
-      <p:sp>
-        <p:nvSpPr>
-          <p:cNvPr id="323" name="Google Shape;323;g61c43cb06b_0_539:notes"/>
+          <p:cNvPr id="326" name="Google Shape;326;g61c43cb06b_1_12:notes"/>
           <p:cNvSpPr txBox="1">
             <a:spLocks noGrp="1"/>
           </p:cNvSpPr>
@@ -15681,7 +15786,7 @@
   <p:cSld>
     <p:spTree>
       <p:nvGrpSpPr>
-        <p:cNvPr id="1" name="Shape 324"/>
+        <p:cNvPr id="1" name="Shape 327"/>
         <p:cNvGrpSpPr/>
         <p:nvPr/>
       </p:nvGrpSpPr>
@@ -15695,7 +15800,7 @@
       </p:grpSpPr>
       <p:sp>
         <p:nvSpPr>
-          <p:cNvPr id="325" name="Google Shape;325;p21"/>
+          <p:cNvPr id="328" name="Google Shape;328;p21"/>
           <p:cNvSpPr txBox="1">
             <a:spLocks noGrp="1"/>
           </p:cNvSpPr>
@@ -15729,6 +15834,131 @@
             </a:pPr>
             <a:r>
               <a:rPr lang="es"/>
+              <a:t>Conclusiones</a:t>
+            </a:r>
+            <a:endParaRPr/>
+          </a:p>
+        </p:txBody>
+      </p:sp>
+      <p:sp>
+        <p:nvSpPr>
+          <p:cNvPr id="329" name="Google Shape;329;p21"/>
+          <p:cNvSpPr txBox="1">
+            <a:spLocks noGrp="1"/>
+          </p:cNvSpPr>
+          <p:nvPr>
+            <p:ph type="body" idx="1"/>
+          </p:nvPr>
+        </p:nvSpPr>
+        <p:spPr>
+          <a:xfrm>
+            <a:off x="1303800" y="1990050"/>
+            <a:ext cx="7030500" cy="2541600"/>
+          </a:xfrm>
+          <a:prstGeom prst="rect">
+            <a:avLst/>
+          </a:prstGeom>
+        </p:spPr>
+        <p:txBody>
+          <a:bodyPr spcFirstLastPara="1" wrap="square" lIns="91425" tIns="91425" rIns="91425" bIns="91425" anchor="t" anchorCtr="0">
+            <a:noAutofit/>
+          </a:bodyPr>
+          <a:lstStyle/>
+          <a:p>
+            <a:pPr marL="0" lvl="0" indent="0" algn="just" rtl="0">
+              <a:spcBef>
+                <a:spcPts val="0"/>
+              </a:spcBef>
+              <a:spcAft>
+                <a:spcPts val="0"/>
+              </a:spcAft>
+              <a:buNone/>
+            </a:pPr>
+            <a:r>
+              <a:rPr lang="es"/>
+              <a:t>Observando las gráficas obtenidas por los datos proporcionados por la página The World Bank, podemos observar que en los últimos años la tasa de natalidad ha disminuido considerablemente y sigue bajando esta. Esto nos quiere decir que cada día hay más personas que no desean tener hijos o se previene mucho los embarazos.</a:t>
+            </a:r>
+            <a:endParaRPr/>
+          </a:p>
+          <a:p>
+            <a:pPr marL="0" lvl="0" indent="0" algn="just" rtl="0">
+              <a:spcBef>
+                <a:spcPts val="1600"/>
+              </a:spcBef>
+              <a:spcAft>
+                <a:spcPts val="1600"/>
+              </a:spcAft>
+              <a:buNone/>
+            </a:pPr>
+            <a:r>
+              <a:rPr lang="es"/>
+              <a:t>A través de nuestra gráfica de ajuste de curvas, pudimos concluir que el polinomio que más se ajusta es el de grado tres.</a:t>
+            </a:r>
+            <a:endParaRPr/>
+          </a:p>
+        </p:txBody>
+      </p:sp>
+    </p:spTree>
+  </p:cSld>
+  <p:clrMapOvr>
+    <a:masterClrMapping/>
+  </p:clrMapOvr>
+</p:sld>
+</file>
+
+<file path=ppt/slides/slide11.xml><?xml version="1.0" encoding="utf-8"?>
+<p:sld xmlns:a="http://schemas.openxmlformats.org/drawingml/2006/main" xmlns:r="http://schemas.openxmlformats.org/officeDocument/2006/relationships" xmlns:p="http://schemas.openxmlformats.org/presentationml/2006/main">
+  <p:cSld>
+    <p:spTree>
+      <p:nvGrpSpPr>
+        <p:cNvPr id="1" name="Shape 333"/>
+        <p:cNvGrpSpPr/>
+        <p:nvPr/>
+      </p:nvGrpSpPr>
+      <p:grpSpPr>
+        <a:xfrm>
+          <a:off x="0" y="0"/>
+          <a:ext cx="0" cy="0"/>
+          <a:chOff x="0" y="0"/>
+          <a:chExt cx="0" cy="0"/>
+        </a:xfrm>
+      </p:grpSpPr>
+      <p:sp>
+        <p:nvSpPr>
+          <p:cNvPr id="334" name="Google Shape;334;p22"/>
+          <p:cNvSpPr txBox="1">
+            <a:spLocks noGrp="1"/>
+          </p:cNvSpPr>
+          <p:nvPr>
+            <p:ph type="title"/>
+          </p:nvPr>
+        </p:nvSpPr>
+        <p:spPr>
+          <a:xfrm>
+            <a:off x="1303800" y="598575"/>
+            <a:ext cx="7030500" cy="999300"/>
+          </a:xfrm>
+          <a:prstGeom prst="rect">
+            <a:avLst/>
+          </a:prstGeom>
+        </p:spPr>
+        <p:txBody>
+          <a:bodyPr spcFirstLastPara="1" wrap="square" lIns="91425" tIns="91425" rIns="91425" bIns="91425" anchor="t" anchorCtr="0">
+            <a:noAutofit/>
+          </a:bodyPr>
+          <a:lstStyle/>
+          <a:p>
+            <a:pPr marL="0" lvl="0" indent="0" algn="l" rtl="0">
+              <a:spcBef>
+                <a:spcPts val="0"/>
+              </a:spcBef>
+              <a:spcAft>
+                <a:spcPts val="0"/>
+              </a:spcAft>
+              <a:buNone/>
+            </a:pPr>
+            <a:r>
+              <a:rPr lang="es"/>
               <a:t>Fuentes:</a:t>
             </a:r>
             <a:endParaRPr/>
@@ -15737,7 +15967,7 @@
       </p:sp>
       <p:sp>
         <p:nvSpPr>
-          <p:cNvPr id="326" name="Google Shape;326;p21"/>
+          <p:cNvPr id="335" name="Google Shape;335;p22"/>
           <p:cNvSpPr txBox="1">
             <a:spLocks noGrp="1"/>
           </p:cNvSpPr>
@@ -16324,6 +16554,34 @@
           </a:p>
         </p:txBody>
       </p:sp>
+      <p:pic>
+        <p:nvPicPr>
+          <p:cNvPr id="298" name="Google Shape;298;p16"/>
+          <p:cNvPicPr preferRelativeResize="0"/>
+          <p:nvPr/>
+        </p:nvPicPr>
+        <p:blipFill>
+          <a:blip r:embed="rId3">
+            <a:alphaModFix/>
+          </a:blip>
+          <a:stretch>
+            <a:fillRect/>
+          </a:stretch>
+        </p:blipFill>
+        <p:spPr>
+          <a:xfrm>
+            <a:off x="7322350" y="3321850"/>
+            <a:ext cx="1821650" cy="1821650"/>
+          </a:xfrm>
+          <a:prstGeom prst="rect">
+            <a:avLst/>
+          </a:prstGeom>
+          <a:noFill/>
+          <a:ln>
+            <a:noFill/>
+          </a:ln>
+        </p:spPr>
+      </p:pic>
     </p:spTree>
   </p:cSld>
   <p:clrMapOvr>
@@ -16337,7 +16595,7 @@
   <p:cSld>
     <p:spTree>
       <p:nvGrpSpPr>
-        <p:cNvPr id="1" name="Shape 301"/>
+        <p:cNvPr id="1" name="Shape 302"/>
         <p:cNvGrpSpPr/>
         <p:nvPr/>
       </p:nvGrpSpPr>
@@ -16351,7 +16609,88 @@
       </p:grpSpPr>
       <p:pic>
         <p:nvPicPr>
-          <p:cNvPr id="302" name="Google Shape;302;p17"/>
+          <p:cNvPr id="305" name="Google Shape;305;p17"/>
+          <p:cNvPicPr preferRelativeResize="0"/>
+          <p:nvPr/>
+        </p:nvPicPr>
+        <p:blipFill>
+          <a:blip r:embed="rId3">
+            <a:alphaModFix/>
+          </a:blip>
+          <a:stretch>
+            <a:fillRect/>
+          </a:stretch>
+        </p:blipFill>
+        <p:spPr>
+          <a:xfrm>
+            <a:off x="1920438" y="245303"/>
+            <a:ext cx="1790029" cy="4713195"/>
+          </a:xfrm>
+          <a:prstGeom prst="rect">
+            <a:avLst/>
+          </a:prstGeom>
+          <a:noFill/>
+          <a:ln>
+            <a:noFill/>
+          </a:ln>
+        </p:spPr>
+      </p:pic>
+      <p:pic>
+        <p:nvPicPr>
+          <p:cNvPr id="306" name="Google Shape;306;p17"/>
+          <p:cNvPicPr preferRelativeResize="0"/>
+          <p:nvPr/>
+        </p:nvPicPr>
+        <p:blipFill>
+          <a:blip r:embed="rId4">
+            <a:alphaModFix/>
+          </a:blip>
+          <a:stretch>
+            <a:fillRect/>
+          </a:stretch>
+        </p:blipFill>
+        <p:spPr>
+          <a:xfrm>
+            <a:off x="4747955" y="245303"/>
+            <a:ext cx="1878041" cy="4834218"/>
+          </a:xfrm>
+          <a:prstGeom prst="rect">
+            <a:avLst/>
+          </a:prstGeom>
+          <a:noFill/>
+          <a:ln>
+            <a:noFill/>
+          </a:ln>
+        </p:spPr>
+      </p:pic>
+    </p:spTree>
+  </p:cSld>
+  <p:clrMapOvr>
+    <a:masterClrMapping/>
+  </p:clrMapOvr>
+</p:sld>
+</file>
+
+<file path=ppt/slides/slide7.xml><?xml version="1.0" encoding="utf-8"?>
+<p:sld xmlns:a="http://schemas.openxmlformats.org/drawingml/2006/main" xmlns:r="http://schemas.openxmlformats.org/officeDocument/2006/relationships" xmlns:p="http://schemas.openxmlformats.org/presentationml/2006/main">
+  <p:cSld>
+    <p:spTree>
+      <p:nvGrpSpPr>
+        <p:cNvPr id="1" name="Shape 310"/>
+        <p:cNvGrpSpPr/>
+        <p:nvPr/>
+      </p:nvGrpSpPr>
+      <p:grpSpPr>
+        <a:xfrm>
+          <a:off x="0" y="0"/>
+          <a:ext cx="0" cy="0"/>
+          <a:chOff x="0" y="0"/>
+          <a:chExt cx="0" cy="0"/>
+        </a:xfrm>
+      </p:grpSpPr>
+      <p:pic>
+        <p:nvPicPr>
+          <p:cNvPr id="311" name="Google Shape;311;p18"/>
           <p:cNvPicPr preferRelativeResize="0"/>
           <p:nvPr/>
         </p:nvPicPr>
@@ -16385,12 +16724,12 @@
 </p:sld>
 </file>
 
-<file path=ppt/slides/slide7.xml><?xml version="1.0" encoding="utf-8"?>
+<file path=ppt/slides/slide8.xml><?xml version="1.0" encoding="utf-8"?>
 <p:sld xmlns:a="http://schemas.openxmlformats.org/drawingml/2006/main" xmlns:r="http://schemas.openxmlformats.org/officeDocument/2006/relationships" xmlns:p="http://schemas.openxmlformats.org/presentationml/2006/main">
   <p:cSld>
     <p:spTree>
       <p:nvGrpSpPr>
-        <p:cNvPr id="1" name="Shape 306"/>
+        <p:cNvPr id="1" name="Shape 315"/>
         <p:cNvGrpSpPr/>
         <p:nvPr/>
       </p:nvGrpSpPr>
@@ -16404,7 +16743,7 @@
       </p:grpSpPr>
       <p:pic>
         <p:nvPicPr>
-          <p:cNvPr id="307" name="Google Shape;307;p18"/>
+          <p:cNvPr id="316" name="Google Shape;316;p19"/>
           <p:cNvPicPr preferRelativeResize="0"/>
           <p:nvPr/>
         </p:nvPicPr>
@@ -16438,12 +16777,12 @@
 </p:sld>
 </file>
 
-<file path=ppt/slides/slide8.xml><?xml version="1.0" encoding="utf-8"?>
+<file path=ppt/slides/slide9.xml><?xml version="1.0" encoding="utf-8"?>
 <p:sld xmlns:a="http://schemas.openxmlformats.org/drawingml/2006/main" xmlns:r="http://schemas.openxmlformats.org/officeDocument/2006/relationships" xmlns:p="http://schemas.openxmlformats.org/presentationml/2006/main">
   <p:cSld>
     <p:spTree>
       <p:nvGrpSpPr>
-        <p:cNvPr id="1" name="Shape 311"/>
+        <p:cNvPr id="1" name="Shape 320"/>
         <p:cNvGrpSpPr/>
         <p:nvPr/>
       </p:nvGrpSpPr>
@@ -16457,7 +16796,7 @@
       </p:grpSpPr>
       <p:sp>
         <p:nvSpPr>
-          <p:cNvPr id="312" name="Google Shape;312;p19"/>
+          <p:cNvPr id="321" name="Google Shape;321;p20"/>
           <p:cNvSpPr txBox="1">
             <a:spLocks noGrp="1"/>
           </p:cNvSpPr>
@@ -16495,7 +16834,7 @@
       </p:sp>
       <p:sp>
         <p:nvSpPr>
-          <p:cNvPr id="313" name="Google Shape;313;p19"/>
+          <p:cNvPr id="322" name="Google Shape;322;p20"/>
           <p:cNvSpPr txBox="1">
             <a:spLocks noGrp="1"/>
           </p:cNvSpPr>
@@ -16533,7 +16872,7 @@
       </p:sp>
       <p:pic>
         <p:nvPicPr>
-          <p:cNvPr id="314" name="Google Shape;314;p19"/>
+          <p:cNvPr id="323" name="Google Shape;323;p20"/>
           <p:cNvPicPr preferRelativeResize="0"/>
           <p:nvPr/>
         </p:nvPicPr>
@@ -16559,131 +16898,6 @@
           </a:ln>
         </p:spPr>
       </p:pic>
-    </p:spTree>
-  </p:cSld>
-  <p:clrMapOvr>
-    <a:masterClrMapping/>
-  </p:clrMapOvr>
-</p:sld>
-</file>
-
-<file path=ppt/slides/slide9.xml><?xml version="1.0" encoding="utf-8"?>
-<p:sld xmlns:a="http://schemas.openxmlformats.org/drawingml/2006/main" xmlns:r="http://schemas.openxmlformats.org/officeDocument/2006/relationships" xmlns:p="http://schemas.openxmlformats.org/presentationml/2006/main">
-  <p:cSld>
-    <p:spTree>
-      <p:nvGrpSpPr>
-        <p:cNvPr id="1" name="Shape 318"/>
-        <p:cNvGrpSpPr/>
-        <p:nvPr/>
-      </p:nvGrpSpPr>
-      <p:grpSpPr>
-        <a:xfrm>
-          <a:off x="0" y="0"/>
-          <a:ext cx="0" cy="0"/>
-          <a:chOff x="0" y="0"/>
-          <a:chExt cx="0" cy="0"/>
-        </a:xfrm>
-      </p:grpSpPr>
-      <p:sp>
-        <p:nvSpPr>
-          <p:cNvPr id="319" name="Google Shape;319;p20"/>
-          <p:cNvSpPr txBox="1">
-            <a:spLocks noGrp="1"/>
-          </p:cNvSpPr>
-          <p:nvPr>
-            <p:ph type="title"/>
-          </p:nvPr>
-        </p:nvSpPr>
-        <p:spPr>
-          <a:xfrm>
-            <a:off x="1303800" y="598575"/>
-            <a:ext cx="7030500" cy="999300"/>
-          </a:xfrm>
-          <a:prstGeom prst="rect">
-            <a:avLst/>
-          </a:prstGeom>
-        </p:spPr>
-        <p:txBody>
-          <a:bodyPr spcFirstLastPara="1" wrap="square" lIns="91425" tIns="91425" rIns="91425" bIns="91425" anchor="t" anchorCtr="0">
-            <a:noAutofit/>
-          </a:bodyPr>
-          <a:lstStyle/>
-          <a:p>
-            <a:pPr marL="0" lvl="0" indent="0" algn="l" rtl="0">
-              <a:spcBef>
-                <a:spcPts val="0"/>
-              </a:spcBef>
-              <a:spcAft>
-                <a:spcPts val="0"/>
-              </a:spcAft>
-              <a:buNone/>
-            </a:pPr>
-            <a:r>
-              <a:rPr lang="es"/>
-              <a:t>Conclusiones</a:t>
-            </a:r>
-            <a:endParaRPr/>
-          </a:p>
-        </p:txBody>
-      </p:sp>
-      <p:sp>
-        <p:nvSpPr>
-          <p:cNvPr id="320" name="Google Shape;320;p20"/>
-          <p:cNvSpPr txBox="1">
-            <a:spLocks noGrp="1"/>
-          </p:cNvSpPr>
-          <p:nvPr>
-            <p:ph type="body" idx="1"/>
-          </p:nvPr>
-        </p:nvSpPr>
-        <p:spPr>
-          <a:xfrm>
-            <a:off x="1303800" y="1990050"/>
-            <a:ext cx="7030500" cy="2541600"/>
-          </a:xfrm>
-          <a:prstGeom prst="rect">
-            <a:avLst/>
-          </a:prstGeom>
-        </p:spPr>
-        <p:txBody>
-          <a:bodyPr spcFirstLastPara="1" wrap="square" lIns="91425" tIns="91425" rIns="91425" bIns="91425" anchor="t" anchorCtr="0">
-            <a:noAutofit/>
-          </a:bodyPr>
-          <a:lstStyle/>
-          <a:p>
-            <a:pPr marL="0" lvl="0" indent="0" algn="just" rtl="0">
-              <a:spcBef>
-                <a:spcPts val="0"/>
-              </a:spcBef>
-              <a:spcAft>
-                <a:spcPts val="0"/>
-              </a:spcAft>
-              <a:buNone/>
-            </a:pPr>
-            <a:r>
-              <a:rPr lang="es"/>
-              <a:t>Observando las gráficas obtenidas por los datos proporcionados por la página The World Bank, podemos observar que en los últimos años la tasa de natalidad ha disminuido considerablemente y sigue bajando esta. Esto nos quiere decir que cada día hay más personas que no desean tener hijos o se previene mucho los embarazos.</a:t>
-            </a:r>
-            <a:endParaRPr/>
-          </a:p>
-          <a:p>
-            <a:pPr marL="0" lvl="0" indent="0" algn="just" rtl="0">
-              <a:spcBef>
-                <a:spcPts val="1600"/>
-              </a:spcBef>
-              <a:spcAft>
-                <a:spcPts val="1600"/>
-              </a:spcAft>
-              <a:buNone/>
-            </a:pPr>
-            <a:r>
-              <a:rPr lang="es"/>
-              <a:t>A través de nuestra gráfica de ajuste de curvas, pudimos concluir que el polinomio que más se ajusta es el de grado tres.</a:t>
-            </a:r>
-            <a:endParaRPr/>
-          </a:p>
-        </p:txBody>
-      </p:sp>
     </p:spTree>
   </p:cSld>
   <p:clrMapOvr>

</xml_diff>